<commit_message>
+this is not the end, this is just the beginning
</commit_message>
<xml_diff>
--- a/course_works/computer_graphics/presentation/presentation.pptx
+++ b/course_works/computer_graphics/presentation/presentation.pptx
@@ -15,8 +15,8 @@
     <p:sldId id="260" r:id="rId9"/>
     <p:sldId id="264" r:id="rId10"/>
     <p:sldId id="265" r:id="rId11"/>
-    <p:sldId id="267" r:id="rId12"/>
-    <p:sldId id="268" r:id="rId13"/>
+    <p:sldId id="268" r:id="rId12"/>
+    <p:sldId id="267" r:id="rId13"/>
   </p:sldIdLst>
   <p:sldSz cx="12192000" cy="6858000"/>
   <p:notesSz cx="6858000" cy="9144000"/>
@@ -3444,7 +3444,7 @@
                 <a:latin typeface="Times New Roman" panose="02020603050405020304" pitchFamily="18" charset="0"/>
                 <a:cs typeface="Times New Roman" panose="02020603050405020304" pitchFamily="18" charset="0"/>
               </a:rPr>
-              <a:t>Заключение</a:t>
+              <a:t>Проведение исследований</a:t>
             </a:r>
             <a:endParaRPr lang="ru-RU" sz="2800" b="1" dirty="0">
               <a:latin typeface="Times New Roman" panose="02020603050405020304" pitchFamily="18" charset="0"/>
@@ -3453,16 +3453,46 @@
           </a:p>
         </p:txBody>
       </p:sp>
-      <p:sp>
-        <p:nvSpPr>
-          <p:cNvPr id="3" name="TextBox 2"/>
+      <p:pic>
+        <p:nvPicPr>
+          <p:cNvPr id="3" name="Рисунок 2"/>
+          <p:cNvPicPr>
+            <a:picLocks noChangeAspect="1"/>
+          </p:cNvPicPr>
+          <p:nvPr/>
+        </p:nvPicPr>
+        <p:blipFill>
+          <a:blip r:embed="rId2">
+            <a:extLst>
+              <a:ext uri="{28A0092B-C50C-407E-A947-70E740481C1C}">
+                <a14:useLocalDpi xmlns:a14="http://schemas.microsoft.com/office/drawing/2010/main" val="0"/>
+              </a:ext>
+            </a:extLst>
+          </a:blip>
+          <a:stretch>
+            <a:fillRect/>
+          </a:stretch>
+        </p:blipFill>
+        <p:spPr>
+          <a:xfrm>
+            <a:off x="2490284" y="792989"/>
+            <a:ext cx="7211431" cy="4401164"/>
+          </a:xfrm>
+          <a:prstGeom prst="rect">
+            <a:avLst/>
+          </a:prstGeom>
+        </p:spPr>
+      </p:pic>
+      <p:sp>
+        <p:nvSpPr>
+          <p:cNvPr id="4" name="TextBox 3"/>
           <p:cNvSpPr txBox="1"/>
           <p:nvPr/>
         </p:nvSpPr>
         <p:spPr>
           <a:xfrm>
-            <a:off x="187234" y="636431"/>
-            <a:ext cx="11817531" cy="5863144"/>
+            <a:off x="2586446" y="5277394"/>
+            <a:ext cx="7001691" cy="707886"/>
           </a:xfrm>
           <a:prstGeom prst="rect">
             <a:avLst/>
@@ -3475,361 +3505,31 @@
           </a:bodyPr>
           <a:lstStyle/>
           <a:p>
-            <a:pPr>
-              <a:lnSpc>
-                <a:spcPct val="125000"/>
-              </a:lnSpc>
-            </a:pPr>
-            <a:r>
-              <a:rPr lang="ru-RU" sz="2000" dirty="0">
-                <a:latin typeface="Times New Roman" panose="02020603050405020304" pitchFamily="18" charset="0"/>
-                <a:cs typeface="Times New Roman" panose="02020603050405020304" pitchFamily="18" charset="0"/>
-              </a:rPr>
-              <a:t>В ходе выполнения курсовой работы было разработана программа </a:t>
-            </a:r>
+            <a:pPr algn="ctr"/>
             <a:r>
               <a:rPr lang="ru-RU" sz="2000" dirty="0" smtClean="0">
                 <a:latin typeface="Times New Roman" panose="02020603050405020304" pitchFamily="18" charset="0"/>
                 <a:cs typeface="Times New Roman" panose="02020603050405020304" pitchFamily="18" charset="0"/>
               </a:rPr>
-              <a:t>визуализации </a:t>
-            </a:r>
-            <a:r>
-              <a:rPr lang="ru-RU" sz="2000" dirty="0">
-                <a:latin typeface="Times New Roman" panose="02020603050405020304" pitchFamily="18" charset="0"/>
-                <a:cs typeface="Times New Roman" panose="02020603050405020304" pitchFamily="18" charset="0"/>
-              </a:rPr>
-              <a:t>композиции трехмерных многогранных примитивов в соответствии </a:t>
-            </a:r>
-            <a:r>
-              <a:rPr lang="ru-RU" sz="2000" dirty="0" smtClean="0">
-                <a:latin typeface="Times New Roman" panose="02020603050405020304" pitchFamily="18" charset="0"/>
-                <a:cs typeface="Times New Roman" panose="02020603050405020304" pitchFamily="18" charset="0"/>
-              </a:rPr>
-              <a:t>с задачами</a:t>
-            </a:r>
-            <a:r>
-              <a:rPr lang="ru-RU" sz="2000" dirty="0">
-                <a:latin typeface="Times New Roman" panose="02020603050405020304" pitchFamily="18" charset="0"/>
-                <a:cs typeface="Times New Roman" panose="02020603050405020304" pitchFamily="18" charset="0"/>
-              </a:rPr>
-              <a:t>, поставленными </a:t>
-            </a:r>
-            <a:r>
-              <a:rPr lang="ru-RU" sz="2000" dirty="0" smtClean="0">
-                <a:latin typeface="Times New Roman" panose="02020603050405020304" pitchFamily="18" charset="0"/>
-                <a:cs typeface="Times New Roman" panose="02020603050405020304" pitchFamily="18" charset="0"/>
-              </a:rPr>
-              <a:t>техническим заданием.</a:t>
-            </a:r>
-            <a:br>
-              <a:rPr lang="ru-RU" sz="2000" dirty="0" smtClean="0">
-                <a:latin typeface="Times New Roman" panose="02020603050405020304" pitchFamily="18" charset="0"/>
-                <a:cs typeface="Times New Roman" panose="02020603050405020304" pitchFamily="18" charset="0"/>
-              </a:rPr>
-            </a:br>
-            <a:r>
-              <a:rPr lang="ru-RU" sz="2000" dirty="0" smtClean="0">
-                <a:latin typeface="Times New Roman" panose="02020603050405020304" pitchFamily="18" charset="0"/>
-                <a:cs typeface="Times New Roman" panose="02020603050405020304" pitchFamily="18" charset="0"/>
-              </a:rPr>
-              <a:t/>
-            </a:r>
-            <a:br>
-              <a:rPr lang="ru-RU" sz="2000" dirty="0" smtClean="0">
-                <a:latin typeface="Times New Roman" panose="02020603050405020304" pitchFamily="18" charset="0"/>
-                <a:cs typeface="Times New Roman" panose="02020603050405020304" pitchFamily="18" charset="0"/>
-              </a:rPr>
-            </a:br>
-            <a:r>
-              <a:rPr lang="ru-RU" sz="2000" dirty="0" smtClean="0">
-                <a:latin typeface="Times New Roman" panose="02020603050405020304" pitchFamily="18" charset="0"/>
-                <a:cs typeface="Times New Roman" panose="02020603050405020304" pitchFamily="18" charset="0"/>
-              </a:rPr>
-              <a:t>В </a:t>
-            </a:r>
-            <a:r>
-              <a:rPr lang="ru-RU" sz="2000" dirty="0">
-                <a:latin typeface="Times New Roman" panose="02020603050405020304" pitchFamily="18" charset="0"/>
-                <a:cs typeface="Times New Roman" panose="02020603050405020304" pitchFamily="18" charset="0"/>
-              </a:rPr>
-              <a:t>процессе разработки были решены все обозначенные </a:t>
-            </a:r>
-            <a:r>
-              <a:rPr lang="ru-RU" sz="2000" dirty="0" smtClean="0">
-                <a:latin typeface="Times New Roman" panose="02020603050405020304" pitchFamily="18" charset="0"/>
-                <a:cs typeface="Times New Roman" panose="02020603050405020304" pitchFamily="18" charset="0"/>
-              </a:rPr>
-              <a:t>задачи</a:t>
-            </a:r>
-            <a:r>
-              <a:rPr lang="ru-RU" sz="2000" dirty="0">
-                <a:latin typeface="Times New Roman" panose="02020603050405020304" pitchFamily="18" charset="0"/>
-                <a:cs typeface="Times New Roman" panose="02020603050405020304" pitchFamily="18" charset="0"/>
-              </a:rPr>
-              <a:t>:</a:t>
-            </a:r>
-          </a:p>
-          <a:p>
-            <a:pPr marL="457200" indent="-457200" algn="just">
-              <a:lnSpc>
-                <a:spcPct val="125000"/>
-              </a:lnSpc>
-              <a:buFont typeface="+mj-lt"/>
-              <a:buAutoNum type="arabicPeriod"/>
-            </a:pPr>
-            <a:r>
-              <a:rPr lang="ru-RU" sz="2000" dirty="0" smtClean="0">
-                <a:latin typeface="Times New Roman" panose="02020603050405020304" pitchFamily="18" charset="0"/>
-                <a:cs typeface="Times New Roman" panose="02020603050405020304" pitchFamily="18" charset="0"/>
-              </a:rPr>
-              <a:t>описаны </a:t>
-            </a:r>
-            <a:r>
-              <a:rPr lang="ru-RU" sz="2000" dirty="0">
-                <a:latin typeface="Times New Roman" panose="02020603050405020304" pitchFamily="18" charset="0"/>
-                <a:cs typeface="Times New Roman" panose="02020603050405020304" pitchFamily="18" charset="0"/>
-              </a:rPr>
-              <a:t>объекты сцены, что позволило создать четкое </a:t>
-            </a:r>
-            <a:r>
-              <a:rPr lang="ru-RU" sz="2000" dirty="0" smtClean="0">
-                <a:latin typeface="Times New Roman" panose="02020603050405020304" pitchFamily="18" charset="0"/>
-                <a:cs typeface="Times New Roman" panose="02020603050405020304" pitchFamily="18" charset="0"/>
-              </a:rPr>
-              <a:t>представление о </a:t>
-            </a:r>
-            <a:r>
-              <a:rPr lang="ru-RU" sz="2000" dirty="0">
-                <a:latin typeface="Times New Roman" panose="02020603050405020304" pitchFamily="18" charset="0"/>
-                <a:cs typeface="Times New Roman" panose="02020603050405020304" pitchFamily="18" charset="0"/>
-              </a:rPr>
-              <a:t>визуализируемых элементах;</a:t>
-            </a:r>
-          </a:p>
-          <a:p>
-            <a:pPr marL="457200" indent="-457200" algn="just">
-              <a:lnSpc>
-                <a:spcPct val="125000"/>
-              </a:lnSpc>
-              <a:buFont typeface="+mj-lt"/>
-              <a:buAutoNum type="arabicPeriod"/>
-            </a:pPr>
-            <a:r>
-              <a:rPr lang="ru-RU" sz="2000" dirty="0" smtClean="0">
-                <a:latin typeface="Times New Roman" panose="02020603050405020304" pitchFamily="18" charset="0"/>
-                <a:cs typeface="Times New Roman" panose="02020603050405020304" pitchFamily="18" charset="0"/>
-              </a:rPr>
-              <a:t>проанализированы известные </a:t>
-            </a:r>
-            <a:r>
-              <a:rPr lang="ru-RU" sz="2000" dirty="0">
-                <a:latin typeface="Times New Roman" panose="02020603050405020304" pitchFamily="18" charset="0"/>
-                <a:cs typeface="Times New Roman" panose="02020603050405020304" pitchFamily="18" charset="0"/>
-              </a:rPr>
-              <a:t>алгоритмы компьютерной </a:t>
-            </a:r>
-            <a:r>
-              <a:rPr lang="ru-RU" sz="2000" dirty="0" smtClean="0">
-                <a:latin typeface="Times New Roman" panose="02020603050405020304" pitchFamily="18" charset="0"/>
-                <a:cs typeface="Times New Roman" panose="02020603050405020304" pitchFamily="18" charset="0"/>
-              </a:rPr>
-              <a:t>графики для </a:t>
-            </a:r>
-            <a:r>
-              <a:rPr lang="ru-RU" sz="2000" dirty="0">
-                <a:latin typeface="Times New Roman" panose="02020603050405020304" pitchFamily="18" charset="0"/>
-                <a:cs typeface="Times New Roman" panose="02020603050405020304" pitchFamily="18" charset="0"/>
-              </a:rPr>
-              <a:t>генерации реалистичных моделей и трехмерной сцены, что </a:t>
-            </a:r>
-            <a:r>
-              <a:rPr lang="ru-RU" sz="2000" dirty="0" smtClean="0">
-                <a:latin typeface="Times New Roman" panose="02020603050405020304" pitchFamily="18" charset="0"/>
-                <a:cs typeface="Times New Roman" panose="02020603050405020304" pitchFamily="18" charset="0"/>
-              </a:rPr>
-              <a:t>обеспечило выбор </a:t>
-            </a:r>
-            <a:r>
-              <a:rPr lang="ru-RU" sz="2000" dirty="0">
-                <a:latin typeface="Times New Roman" panose="02020603050405020304" pitchFamily="18" charset="0"/>
-                <a:cs typeface="Times New Roman" panose="02020603050405020304" pitchFamily="18" charset="0"/>
-              </a:rPr>
-              <a:t>наиболее эффективных решений;</a:t>
-            </a:r>
-          </a:p>
-          <a:p>
-            <a:pPr marL="457200" indent="-457200" algn="just">
-              <a:lnSpc>
-                <a:spcPct val="125000"/>
-              </a:lnSpc>
-              <a:buFont typeface="+mj-lt"/>
-              <a:buAutoNum type="arabicPeriod"/>
-            </a:pPr>
-            <a:r>
-              <a:rPr lang="ru-RU" sz="2000" dirty="0" smtClean="0">
-                <a:latin typeface="Times New Roman" panose="02020603050405020304" pitchFamily="18" charset="0"/>
-                <a:cs typeface="Times New Roman" panose="02020603050405020304" pitchFamily="18" charset="0"/>
-              </a:rPr>
-              <a:t>выбраны </a:t>
-            </a:r>
-            <a:r>
-              <a:rPr lang="ru-RU" sz="2000" dirty="0">
-                <a:latin typeface="Times New Roman" panose="02020603050405020304" pitchFamily="18" charset="0"/>
-                <a:cs typeface="Times New Roman" panose="02020603050405020304" pitchFamily="18" charset="0"/>
-              </a:rPr>
-              <a:t>наиболее подходящие алгоритмы для достижения </a:t>
-            </a:r>
-            <a:r>
-              <a:rPr lang="ru-RU" sz="2000" dirty="0" smtClean="0">
-                <a:latin typeface="Times New Roman" panose="02020603050405020304" pitchFamily="18" charset="0"/>
-                <a:cs typeface="Times New Roman" panose="02020603050405020304" pitchFamily="18" charset="0"/>
-              </a:rPr>
-              <a:t>поставленной </a:t>
-            </a:r>
-            <a:r>
-              <a:rPr lang="ru-RU" sz="2000" dirty="0">
-                <a:latin typeface="Times New Roman" panose="02020603050405020304" pitchFamily="18" charset="0"/>
-                <a:cs typeface="Times New Roman" panose="02020603050405020304" pitchFamily="18" charset="0"/>
-              </a:rPr>
-              <a:t>цели, что способствовало созданию качественной визуализации;</a:t>
-            </a:r>
-          </a:p>
-          <a:p>
-            <a:pPr marL="457200" indent="-457200" algn="just">
-              <a:lnSpc>
-                <a:spcPct val="125000"/>
-              </a:lnSpc>
-              <a:buFont typeface="+mj-lt"/>
-              <a:buAutoNum type="arabicPeriod"/>
-            </a:pPr>
-            <a:r>
-              <a:rPr lang="ru-RU" sz="2000" dirty="0" smtClean="0">
-                <a:latin typeface="Times New Roman" panose="02020603050405020304" pitchFamily="18" charset="0"/>
-                <a:cs typeface="Times New Roman" panose="02020603050405020304" pitchFamily="18" charset="0"/>
-              </a:rPr>
-              <a:t>спроектированы </a:t>
-            </a:r>
-            <a:r>
-              <a:rPr lang="ru-RU" sz="2000" dirty="0">
-                <a:latin typeface="Times New Roman" panose="02020603050405020304" pitchFamily="18" charset="0"/>
-                <a:cs typeface="Times New Roman" panose="02020603050405020304" pitchFamily="18" charset="0"/>
-              </a:rPr>
-              <a:t>архитектура и графический интерфейс </a:t>
-            </a:r>
-            <a:r>
-              <a:rPr lang="ru-RU" sz="2000" dirty="0" smtClean="0">
-                <a:latin typeface="Times New Roman" panose="02020603050405020304" pitchFamily="18" charset="0"/>
-                <a:cs typeface="Times New Roman" panose="02020603050405020304" pitchFamily="18" charset="0"/>
-              </a:rPr>
-              <a:t>приложения, что </a:t>
-            </a:r>
-            <a:r>
-              <a:rPr lang="ru-RU" sz="2000" dirty="0">
-                <a:latin typeface="Times New Roman" panose="02020603050405020304" pitchFamily="18" charset="0"/>
-                <a:cs typeface="Times New Roman" panose="02020603050405020304" pitchFamily="18" charset="0"/>
-              </a:rPr>
-              <a:t>обеспечило удобство взаимодействия пользователя с программой;</a:t>
-            </a:r>
-          </a:p>
-          <a:p>
-            <a:pPr marL="457200" indent="-457200" algn="just">
-              <a:lnSpc>
-                <a:spcPct val="125000"/>
-              </a:lnSpc>
-              <a:buFont typeface="+mj-lt"/>
-              <a:buAutoNum type="arabicPeriod"/>
-            </a:pPr>
-            <a:r>
-              <a:rPr lang="ru-RU" sz="2000" dirty="0" smtClean="0">
-                <a:latin typeface="Times New Roman" panose="02020603050405020304" pitchFamily="18" charset="0"/>
-                <a:cs typeface="Times New Roman" panose="02020603050405020304" pitchFamily="18" charset="0"/>
-              </a:rPr>
-              <a:t>выбраны </a:t>
-            </a:r>
-            <a:r>
-              <a:rPr lang="ru-RU" sz="2000" dirty="0">
-                <a:latin typeface="Times New Roman" panose="02020603050405020304" pitchFamily="18" charset="0"/>
-                <a:cs typeface="Times New Roman" panose="02020603050405020304" pitchFamily="18" charset="0"/>
-              </a:rPr>
-              <a:t>средства реализации программного обеспечения, что </a:t>
-            </a:r>
-            <a:r>
-              <a:rPr lang="ru-RU" sz="2000" dirty="0" smtClean="0">
-                <a:latin typeface="Times New Roman" panose="02020603050405020304" pitchFamily="18" charset="0"/>
-                <a:cs typeface="Times New Roman" panose="02020603050405020304" pitchFamily="18" charset="0"/>
-              </a:rPr>
-              <a:t>позволило </a:t>
-            </a:r>
-            <a:r>
-              <a:rPr lang="ru-RU" sz="2000" dirty="0">
-                <a:latin typeface="Times New Roman" panose="02020603050405020304" pitchFamily="18" charset="0"/>
-                <a:cs typeface="Times New Roman" panose="02020603050405020304" pitchFamily="18" charset="0"/>
-              </a:rPr>
-              <a:t>эффективно использовать доступные ресурсы и технологии;</a:t>
-            </a:r>
-          </a:p>
-          <a:p>
-            <a:pPr marL="457200" indent="-457200" algn="just">
-              <a:lnSpc>
-                <a:spcPct val="125000"/>
-              </a:lnSpc>
-              <a:buFont typeface="+mj-lt"/>
-              <a:buAutoNum type="arabicPeriod"/>
-            </a:pPr>
-            <a:r>
-              <a:rPr lang="ru-RU" sz="2000" dirty="0" smtClean="0">
-                <a:latin typeface="Times New Roman" panose="02020603050405020304" pitchFamily="18" charset="0"/>
-                <a:cs typeface="Times New Roman" panose="02020603050405020304" pitchFamily="18" charset="0"/>
-              </a:rPr>
-              <a:t>реализованы </a:t>
-            </a:r>
-            <a:r>
-              <a:rPr lang="ru-RU" sz="2000" dirty="0">
-                <a:latin typeface="Times New Roman" panose="02020603050405020304" pitchFamily="18" charset="0"/>
-                <a:cs typeface="Times New Roman" panose="02020603050405020304" pitchFamily="18" charset="0"/>
-              </a:rPr>
-              <a:t>выбранные алгоритмы и структуры данных;</a:t>
-            </a:r>
-          </a:p>
-          <a:p>
-            <a:pPr marL="457200" indent="-457200" algn="just">
-              <a:lnSpc>
-                <a:spcPct val="125000"/>
-              </a:lnSpc>
-              <a:buFont typeface="+mj-lt"/>
-              <a:buAutoNum type="arabicPeriod"/>
-            </a:pPr>
-            <a:r>
-              <a:rPr lang="ru-RU" sz="2000" dirty="0" smtClean="0">
-                <a:latin typeface="Times New Roman" panose="02020603050405020304" pitchFamily="18" charset="0"/>
-                <a:cs typeface="Times New Roman" panose="02020603050405020304" pitchFamily="18" charset="0"/>
-              </a:rPr>
-              <a:t>проведено </a:t>
-            </a:r>
-            <a:r>
-              <a:rPr lang="ru-RU" sz="2000" dirty="0">
-                <a:latin typeface="Times New Roman" panose="02020603050405020304" pitchFamily="18" charset="0"/>
-                <a:cs typeface="Times New Roman" panose="02020603050405020304" pitchFamily="18" charset="0"/>
-              </a:rPr>
-              <a:t>исследование быстродействия разработанного приложения.</a:t>
-            </a:r>
+              <a:t>Зависимость времени визуализации сцены от геометрических параметров примитива</a:t>
+            </a:r>
+            <a:endParaRPr lang="ru-RU" sz="2000" dirty="0">
+              <a:latin typeface="Times New Roman" panose="02020603050405020304" pitchFamily="18" charset="0"/>
+              <a:cs typeface="Times New Roman" panose="02020603050405020304" pitchFamily="18" charset="0"/>
+            </a:endParaRPr>
           </a:p>
         </p:txBody>
       </p:sp>
     </p:spTree>
     <p:extLst>
       <p:ext uri="{BB962C8B-B14F-4D97-AF65-F5344CB8AC3E}">
-        <p14:creationId xmlns:p14="http://schemas.microsoft.com/office/powerpoint/2010/main" val="1489680267"/>
+        <p14:creationId xmlns:p14="http://schemas.microsoft.com/office/powerpoint/2010/main" val="3957922080"/>
       </p:ext>
     </p:extLst>
   </p:cSld>
   <p:clrMapOvr>
     <a:masterClrMapping/>
   </p:clrMapOvr>
-  <p:transition spd="slow">
-    <p:push dir="u"/>
-  </p:transition>
   <p:timing>
     <p:tnLst>
       <p:par>
@@ -3865,7 +3565,7 @@
         </p:nvSpPr>
         <p:spPr>
           <a:xfrm>
-            <a:off x="0" y="2821577"/>
+            <a:off x="0" y="113211"/>
             <a:ext cx="12192000" cy="523220"/>
           </a:xfrm>
           <a:prstGeom prst="rect">
@@ -3885,7 +3585,7 @@
                 <a:latin typeface="Times New Roman" panose="02020603050405020304" pitchFamily="18" charset="0"/>
                 <a:cs typeface="Times New Roman" panose="02020603050405020304" pitchFamily="18" charset="0"/>
               </a:rPr>
-              <a:t>Спасибо за внимание</a:t>
+              <a:t>Заключение</a:t>
             </a:r>
             <a:endParaRPr lang="ru-RU" sz="2800" b="1" dirty="0">
               <a:latin typeface="Times New Roman" panose="02020603050405020304" pitchFamily="18" charset="0"/>
@@ -3894,10 +3594,374 @@
           </a:p>
         </p:txBody>
       </p:sp>
+      <p:sp>
+        <p:nvSpPr>
+          <p:cNvPr id="3" name="TextBox 2"/>
+          <p:cNvSpPr txBox="1"/>
+          <p:nvPr/>
+        </p:nvSpPr>
+        <p:spPr>
+          <a:xfrm>
+            <a:off x="187234" y="636431"/>
+            <a:ext cx="11817531" cy="5863144"/>
+          </a:xfrm>
+          <a:prstGeom prst="rect">
+            <a:avLst/>
+          </a:prstGeom>
+          <a:noFill/>
+        </p:spPr>
+        <p:txBody>
+          <a:bodyPr wrap="square" rtlCol="0">
+            <a:spAutoFit/>
+          </a:bodyPr>
+          <a:lstStyle/>
+          <a:p>
+            <a:pPr>
+              <a:lnSpc>
+                <a:spcPct val="125000"/>
+              </a:lnSpc>
+            </a:pPr>
+            <a:r>
+              <a:rPr lang="ru-RU" sz="2000" dirty="0">
+                <a:latin typeface="Times New Roman" panose="02020603050405020304" pitchFamily="18" charset="0"/>
+                <a:cs typeface="Times New Roman" panose="02020603050405020304" pitchFamily="18" charset="0"/>
+              </a:rPr>
+              <a:t>В ходе выполнения курсовой работы было разработана программа </a:t>
+            </a:r>
+            <a:r>
+              <a:rPr lang="ru-RU" sz="2000" dirty="0" smtClean="0">
+                <a:latin typeface="Times New Roman" panose="02020603050405020304" pitchFamily="18" charset="0"/>
+                <a:cs typeface="Times New Roman" panose="02020603050405020304" pitchFamily="18" charset="0"/>
+              </a:rPr>
+              <a:t>визуализации </a:t>
+            </a:r>
+            <a:r>
+              <a:rPr lang="ru-RU" sz="2000" dirty="0">
+                <a:latin typeface="Times New Roman" panose="02020603050405020304" pitchFamily="18" charset="0"/>
+                <a:cs typeface="Times New Roman" panose="02020603050405020304" pitchFamily="18" charset="0"/>
+              </a:rPr>
+              <a:t>композиции трехмерных многогранных примитивов в соответствии </a:t>
+            </a:r>
+            <a:r>
+              <a:rPr lang="ru-RU" sz="2000" dirty="0" smtClean="0">
+                <a:latin typeface="Times New Roman" panose="02020603050405020304" pitchFamily="18" charset="0"/>
+                <a:cs typeface="Times New Roman" panose="02020603050405020304" pitchFamily="18" charset="0"/>
+              </a:rPr>
+              <a:t>с задачами</a:t>
+            </a:r>
+            <a:r>
+              <a:rPr lang="ru-RU" sz="2000" dirty="0">
+                <a:latin typeface="Times New Roman" panose="02020603050405020304" pitchFamily="18" charset="0"/>
+                <a:cs typeface="Times New Roman" panose="02020603050405020304" pitchFamily="18" charset="0"/>
+              </a:rPr>
+              <a:t>, поставленными </a:t>
+            </a:r>
+            <a:r>
+              <a:rPr lang="ru-RU" sz="2000" dirty="0" smtClean="0">
+                <a:latin typeface="Times New Roman" panose="02020603050405020304" pitchFamily="18" charset="0"/>
+                <a:cs typeface="Times New Roman" panose="02020603050405020304" pitchFamily="18" charset="0"/>
+              </a:rPr>
+              <a:t>техническим заданием.</a:t>
+            </a:r>
+            <a:br>
+              <a:rPr lang="ru-RU" sz="2000" dirty="0" smtClean="0">
+                <a:latin typeface="Times New Roman" panose="02020603050405020304" pitchFamily="18" charset="0"/>
+                <a:cs typeface="Times New Roman" panose="02020603050405020304" pitchFamily="18" charset="0"/>
+              </a:rPr>
+            </a:br>
+            <a:r>
+              <a:rPr lang="ru-RU" sz="2000" dirty="0" smtClean="0">
+                <a:latin typeface="Times New Roman" panose="02020603050405020304" pitchFamily="18" charset="0"/>
+                <a:cs typeface="Times New Roman" panose="02020603050405020304" pitchFamily="18" charset="0"/>
+              </a:rPr>
+              <a:t/>
+            </a:r>
+            <a:br>
+              <a:rPr lang="ru-RU" sz="2000" dirty="0" smtClean="0">
+                <a:latin typeface="Times New Roman" panose="02020603050405020304" pitchFamily="18" charset="0"/>
+                <a:cs typeface="Times New Roman" panose="02020603050405020304" pitchFamily="18" charset="0"/>
+              </a:rPr>
+            </a:br>
+            <a:r>
+              <a:rPr lang="ru-RU" sz="2000" dirty="0" smtClean="0">
+                <a:latin typeface="Times New Roman" panose="02020603050405020304" pitchFamily="18" charset="0"/>
+                <a:cs typeface="Times New Roman" panose="02020603050405020304" pitchFamily="18" charset="0"/>
+              </a:rPr>
+              <a:t>В </a:t>
+            </a:r>
+            <a:r>
+              <a:rPr lang="ru-RU" sz="2000" dirty="0">
+                <a:latin typeface="Times New Roman" panose="02020603050405020304" pitchFamily="18" charset="0"/>
+                <a:cs typeface="Times New Roman" panose="02020603050405020304" pitchFamily="18" charset="0"/>
+              </a:rPr>
+              <a:t>процессе разработки были решены все обозначенные </a:t>
+            </a:r>
+            <a:r>
+              <a:rPr lang="ru-RU" sz="2000" dirty="0" smtClean="0">
+                <a:latin typeface="Times New Roman" panose="02020603050405020304" pitchFamily="18" charset="0"/>
+                <a:cs typeface="Times New Roman" panose="02020603050405020304" pitchFamily="18" charset="0"/>
+              </a:rPr>
+              <a:t>задачи</a:t>
+            </a:r>
+            <a:r>
+              <a:rPr lang="ru-RU" sz="2000" dirty="0">
+                <a:latin typeface="Times New Roman" panose="02020603050405020304" pitchFamily="18" charset="0"/>
+                <a:cs typeface="Times New Roman" panose="02020603050405020304" pitchFamily="18" charset="0"/>
+              </a:rPr>
+              <a:t>:</a:t>
+            </a:r>
+          </a:p>
+          <a:p>
+            <a:pPr marL="457200" indent="-457200" algn="just">
+              <a:lnSpc>
+                <a:spcPct val="125000"/>
+              </a:lnSpc>
+              <a:buFont typeface="+mj-lt"/>
+              <a:buAutoNum type="arabicPeriod"/>
+            </a:pPr>
+            <a:r>
+              <a:rPr lang="ru-RU" sz="2000" dirty="0" smtClean="0">
+                <a:latin typeface="Times New Roman" panose="02020603050405020304" pitchFamily="18" charset="0"/>
+                <a:cs typeface="Times New Roman" panose="02020603050405020304" pitchFamily="18" charset="0"/>
+              </a:rPr>
+              <a:t>описаны </a:t>
+            </a:r>
+            <a:r>
+              <a:rPr lang="ru-RU" sz="2000" dirty="0">
+                <a:latin typeface="Times New Roman" panose="02020603050405020304" pitchFamily="18" charset="0"/>
+                <a:cs typeface="Times New Roman" panose="02020603050405020304" pitchFamily="18" charset="0"/>
+              </a:rPr>
+              <a:t>объекты сцены, что позволило создать четкое </a:t>
+            </a:r>
+            <a:r>
+              <a:rPr lang="ru-RU" sz="2000" dirty="0" smtClean="0">
+                <a:latin typeface="Times New Roman" panose="02020603050405020304" pitchFamily="18" charset="0"/>
+                <a:cs typeface="Times New Roman" panose="02020603050405020304" pitchFamily="18" charset="0"/>
+              </a:rPr>
+              <a:t>представление о </a:t>
+            </a:r>
+            <a:r>
+              <a:rPr lang="ru-RU" sz="2000" dirty="0">
+                <a:latin typeface="Times New Roman" panose="02020603050405020304" pitchFamily="18" charset="0"/>
+                <a:cs typeface="Times New Roman" panose="02020603050405020304" pitchFamily="18" charset="0"/>
+              </a:rPr>
+              <a:t>визуализируемых элементах;</a:t>
+            </a:r>
+          </a:p>
+          <a:p>
+            <a:pPr marL="457200" indent="-457200" algn="just">
+              <a:lnSpc>
+                <a:spcPct val="125000"/>
+              </a:lnSpc>
+              <a:buFont typeface="+mj-lt"/>
+              <a:buAutoNum type="arabicPeriod"/>
+            </a:pPr>
+            <a:r>
+              <a:rPr lang="ru-RU" sz="2000" dirty="0" smtClean="0">
+                <a:latin typeface="Times New Roman" panose="02020603050405020304" pitchFamily="18" charset="0"/>
+                <a:cs typeface="Times New Roman" panose="02020603050405020304" pitchFamily="18" charset="0"/>
+              </a:rPr>
+              <a:t>проанализированы известные </a:t>
+            </a:r>
+            <a:r>
+              <a:rPr lang="ru-RU" sz="2000" dirty="0">
+                <a:latin typeface="Times New Roman" panose="02020603050405020304" pitchFamily="18" charset="0"/>
+                <a:cs typeface="Times New Roman" panose="02020603050405020304" pitchFamily="18" charset="0"/>
+              </a:rPr>
+              <a:t>алгоритмы компьютерной </a:t>
+            </a:r>
+            <a:r>
+              <a:rPr lang="ru-RU" sz="2000" dirty="0" smtClean="0">
+                <a:latin typeface="Times New Roman" panose="02020603050405020304" pitchFamily="18" charset="0"/>
+                <a:cs typeface="Times New Roman" panose="02020603050405020304" pitchFamily="18" charset="0"/>
+              </a:rPr>
+              <a:t>графики для </a:t>
+            </a:r>
+            <a:r>
+              <a:rPr lang="ru-RU" sz="2000" dirty="0">
+                <a:latin typeface="Times New Roman" panose="02020603050405020304" pitchFamily="18" charset="0"/>
+                <a:cs typeface="Times New Roman" panose="02020603050405020304" pitchFamily="18" charset="0"/>
+              </a:rPr>
+              <a:t>генерации реалистичных моделей и трехмерной сцены, что </a:t>
+            </a:r>
+            <a:r>
+              <a:rPr lang="ru-RU" sz="2000" dirty="0" smtClean="0">
+                <a:latin typeface="Times New Roman" panose="02020603050405020304" pitchFamily="18" charset="0"/>
+                <a:cs typeface="Times New Roman" panose="02020603050405020304" pitchFamily="18" charset="0"/>
+              </a:rPr>
+              <a:t>обеспечило выбор </a:t>
+            </a:r>
+            <a:r>
+              <a:rPr lang="ru-RU" sz="2000" dirty="0">
+                <a:latin typeface="Times New Roman" panose="02020603050405020304" pitchFamily="18" charset="0"/>
+                <a:cs typeface="Times New Roman" panose="02020603050405020304" pitchFamily="18" charset="0"/>
+              </a:rPr>
+              <a:t>наиболее эффективных решений;</a:t>
+            </a:r>
+          </a:p>
+          <a:p>
+            <a:pPr marL="457200" indent="-457200" algn="just">
+              <a:lnSpc>
+                <a:spcPct val="125000"/>
+              </a:lnSpc>
+              <a:buFont typeface="+mj-lt"/>
+              <a:buAutoNum type="arabicPeriod"/>
+            </a:pPr>
+            <a:r>
+              <a:rPr lang="ru-RU" sz="2000" dirty="0" smtClean="0">
+                <a:latin typeface="Times New Roman" panose="02020603050405020304" pitchFamily="18" charset="0"/>
+                <a:cs typeface="Times New Roman" panose="02020603050405020304" pitchFamily="18" charset="0"/>
+              </a:rPr>
+              <a:t>выбраны </a:t>
+            </a:r>
+            <a:r>
+              <a:rPr lang="ru-RU" sz="2000" dirty="0">
+                <a:latin typeface="Times New Roman" panose="02020603050405020304" pitchFamily="18" charset="0"/>
+                <a:cs typeface="Times New Roman" panose="02020603050405020304" pitchFamily="18" charset="0"/>
+              </a:rPr>
+              <a:t>наиболее подходящие алгоритмы для достижения </a:t>
+            </a:r>
+            <a:r>
+              <a:rPr lang="ru-RU" sz="2000" dirty="0" smtClean="0">
+                <a:latin typeface="Times New Roman" panose="02020603050405020304" pitchFamily="18" charset="0"/>
+                <a:cs typeface="Times New Roman" panose="02020603050405020304" pitchFamily="18" charset="0"/>
+              </a:rPr>
+              <a:t>поставленной </a:t>
+            </a:r>
+            <a:r>
+              <a:rPr lang="ru-RU" sz="2000" dirty="0">
+                <a:latin typeface="Times New Roman" panose="02020603050405020304" pitchFamily="18" charset="0"/>
+                <a:cs typeface="Times New Roman" panose="02020603050405020304" pitchFamily="18" charset="0"/>
+              </a:rPr>
+              <a:t>цели, что способствовало созданию качественной визуализации;</a:t>
+            </a:r>
+          </a:p>
+          <a:p>
+            <a:pPr marL="457200" indent="-457200" algn="just">
+              <a:lnSpc>
+                <a:spcPct val="125000"/>
+              </a:lnSpc>
+              <a:buFont typeface="+mj-lt"/>
+              <a:buAutoNum type="arabicPeriod"/>
+            </a:pPr>
+            <a:r>
+              <a:rPr lang="ru-RU" sz="2000" dirty="0" smtClean="0">
+                <a:latin typeface="Times New Roman" panose="02020603050405020304" pitchFamily="18" charset="0"/>
+                <a:cs typeface="Times New Roman" panose="02020603050405020304" pitchFamily="18" charset="0"/>
+              </a:rPr>
+              <a:t>спроектированы </a:t>
+            </a:r>
+            <a:r>
+              <a:rPr lang="ru-RU" sz="2000" dirty="0">
+                <a:latin typeface="Times New Roman" panose="02020603050405020304" pitchFamily="18" charset="0"/>
+                <a:cs typeface="Times New Roman" panose="02020603050405020304" pitchFamily="18" charset="0"/>
+              </a:rPr>
+              <a:t>архитектура и графический интерфейс </a:t>
+            </a:r>
+            <a:r>
+              <a:rPr lang="ru-RU" sz="2000" dirty="0" smtClean="0">
+                <a:latin typeface="Times New Roman" panose="02020603050405020304" pitchFamily="18" charset="0"/>
+                <a:cs typeface="Times New Roman" panose="02020603050405020304" pitchFamily="18" charset="0"/>
+              </a:rPr>
+              <a:t>приложения, что </a:t>
+            </a:r>
+            <a:r>
+              <a:rPr lang="ru-RU" sz="2000" dirty="0">
+                <a:latin typeface="Times New Roman" panose="02020603050405020304" pitchFamily="18" charset="0"/>
+                <a:cs typeface="Times New Roman" panose="02020603050405020304" pitchFamily="18" charset="0"/>
+              </a:rPr>
+              <a:t>обеспечило удобство взаимодействия пользователя с программой;</a:t>
+            </a:r>
+          </a:p>
+          <a:p>
+            <a:pPr marL="457200" indent="-457200" algn="just">
+              <a:lnSpc>
+                <a:spcPct val="125000"/>
+              </a:lnSpc>
+              <a:buFont typeface="+mj-lt"/>
+              <a:buAutoNum type="arabicPeriod"/>
+            </a:pPr>
+            <a:r>
+              <a:rPr lang="ru-RU" sz="2000" dirty="0" smtClean="0">
+                <a:latin typeface="Times New Roman" panose="02020603050405020304" pitchFamily="18" charset="0"/>
+                <a:cs typeface="Times New Roman" panose="02020603050405020304" pitchFamily="18" charset="0"/>
+              </a:rPr>
+              <a:t>выбраны </a:t>
+            </a:r>
+            <a:r>
+              <a:rPr lang="ru-RU" sz="2000" dirty="0">
+                <a:latin typeface="Times New Roman" panose="02020603050405020304" pitchFamily="18" charset="0"/>
+                <a:cs typeface="Times New Roman" panose="02020603050405020304" pitchFamily="18" charset="0"/>
+              </a:rPr>
+              <a:t>средства реализации программного обеспечения, что </a:t>
+            </a:r>
+            <a:r>
+              <a:rPr lang="ru-RU" sz="2000" dirty="0" smtClean="0">
+                <a:latin typeface="Times New Roman" panose="02020603050405020304" pitchFamily="18" charset="0"/>
+                <a:cs typeface="Times New Roman" panose="02020603050405020304" pitchFamily="18" charset="0"/>
+              </a:rPr>
+              <a:t>позволило </a:t>
+            </a:r>
+            <a:r>
+              <a:rPr lang="ru-RU" sz="2000" dirty="0">
+                <a:latin typeface="Times New Roman" panose="02020603050405020304" pitchFamily="18" charset="0"/>
+                <a:cs typeface="Times New Roman" panose="02020603050405020304" pitchFamily="18" charset="0"/>
+              </a:rPr>
+              <a:t>эффективно использовать доступные ресурсы и технологии;</a:t>
+            </a:r>
+          </a:p>
+          <a:p>
+            <a:pPr marL="457200" indent="-457200" algn="just">
+              <a:lnSpc>
+                <a:spcPct val="125000"/>
+              </a:lnSpc>
+              <a:buFont typeface="+mj-lt"/>
+              <a:buAutoNum type="arabicPeriod"/>
+            </a:pPr>
+            <a:r>
+              <a:rPr lang="ru-RU" sz="2000" dirty="0" smtClean="0">
+                <a:latin typeface="Times New Roman" panose="02020603050405020304" pitchFamily="18" charset="0"/>
+                <a:cs typeface="Times New Roman" panose="02020603050405020304" pitchFamily="18" charset="0"/>
+              </a:rPr>
+              <a:t>реализованы </a:t>
+            </a:r>
+            <a:r>
+              <a:rPr lang="ru-RU" sz="2000" dirty="0">
+                <a:latin typeface="Times New Roman" panose="02020603050405020304" pitchFamily="18" charset="0"/>
+                <a:cs typeface="Times New Roman" panose="02020603050405020304" pitchFamily="18" charset="0"/>
+              </a:rPr>
+              <a:t>выбранные алгоритмы и структуры данных;</a:t>
+            </a:r>
+          </a:p>
+          <a:p>
+            <a:pPr marL="457200" indent="-457200" algn="just">
+              <a:lnSpc>
+                <a:spcPct val="125000"/>
+              </a:lnSpc>
+              <a:buFont typeface="+mj-lt"/>
+              <a:buAutoNum type="arabicPeriod"/>
+            </a:pPr>
+            <a:r>
+              <a:rPr lang="ru-RU" sz="2000" dirty="0" smtClean="0">
+                <a:latin typeface="Times New Roman" panose="02020603050405020304" pitchFamily="18" charset="0"/>
+                <a:cs typeface="Times New Roman" panose="02020603050405020304" pitchFamily="18" charset="0"/>
+              </a:rPr>
+              <a:t>проведено </a:t>
+            </a:r>
+            <a:r>
+              <a:rPr lang="ru-RU" sz="2000" dirty="0">
+                <a:latin typeface="Times New Roman" panose="02020603050405020304" pitchFamily="18" charset="0"/>
+                <a:cs typeface="Times New Roman" panose="02020603050405020304" pitchFamily="18" charset="0"/>
+              </a:rPr>
+              <a:t>исследование быстродействия разработанного приложения.</a:t>
+            </a:r>
+          </a:p>
+        </p:txBody>
+      </p:sp>
     </p:spTree>
     <p:extLst>
       <p:ext uri="{BB962C8B-B14F-4D97-AF65-F5344CB8AC3E}">
-        <p14:creationId xmlns:p14="http://schemas.microsoft.com/office/powerpoint/2010/main" val="3220228156"/>
+        <p14:creationId xmlns:p14="http://schemas.microsoft.com/office/powerpoint/2010/main" val="1489680267"/>
       </p:ext>
     </p:extLst>
   </p:cSld>
@@ -4845,7 +4909,7 @@
                 <a:latin typeface="Times New Roman" panose="02020603050405020304" pitchFamily="18" charset="0"/>
                 <a:cs typeface="Times New Roman" panose="02020603050405020304" pitchFamily="18" charset="0"/>
               </a:rPr>
-              <a:t>Получение изображения от лица камеры</a:t>
+              <a:t>Получение изображения камерой</a:t>
             </a:r>
             <a:endParaRPr lang="ru-RU" sz="2800" b="1" dirty="0">
               <a:latin typeface="Times New Roman" panose="02020603050405020304" pitchFamily="18" charset="0"/>
@@ -4993,14 +5057,14 @@
                 <a:latin typeface="Times New Roman" panose="02020603050405020304" pitchFamily="18" charset="0"/>
                 <a:cs typeface="Times New Roman" panose="02020603050405020304" pitchFamily="18" charset="0"/>
               </a:rPr>
-              <a:t>получения изображения модели на экране от </a:t>
+              <a:t>получения изображения модели </a:t>
             </a:r>
             <a:r>
               <a:rPr lang="ru-RU" sz="2000" dirty="0" smtClean="0">
                 <a:latin typeface="Times New Roman" panose="02020603050405020304" pitchFamily="18" charset="0"/>
                 <a:cs typeface="Times New Roman" panose="02020603050405020304" pitchFamily="18" charset="0"/>
               </a:rPr>
-              <a:t>лица камеры</a:t>
+              <a:t>камерой</a:t>
             </a:r>
             <a:endParaRPr lang="ru-RU" sz="2000" dirty="0">
               <a:latin typeface="Times New Roman" panose="02020603050405020304" pitchFamily="18" charset="0"/>

</xml_diff>